<commit_message>
Added - First Slide
</commit_message>
<xml_diff>
--- a/Qualidade de Software e Governança de TI/NAC1.pptx
+++ b/Qualidade de Software e Governança de TI/NAC1.pptx
@@ -1055,7 +1055,7 @@
 <dgm:dataModel xmlns:dgm="http://schemas.openxmlformats.org/drawingml/2006/diagram" xmlns:a="http://schemas.openxmlformats.org/drawingml/2006/main">
   <dgm:ptLst>
     <dgm:pt modelId="{A50B2181-E5A6-44A1-8756-379E11E86230}" type="doc">
-      <dgm:prSet loTypeId="urn:microsoft.com/office/officeart/2005/8/layout/radial1" loCatId="cycle" qsTypeId="urn:microsoft.com/office/officeart/2005/8/quickstyle/simple1" qsCatId="simple" csTypeId="urn:microsoft.com/office/officeart/2005/8/colors/colorful1" csCatId="colorful" phldr="1"/>
+      <dgm:prSet loTypeId="urn:microsoft.com/office/officeart/2005/8/layout/radial1" loCatId="cycle" qsTypeId="urn:microsoft.com/office/officeart/2005/8/quickstyle/simple4" qsCatId="simple" csTypeId="urn:microsoft.com/office/officeart/2005/8/colors/colorful1" csCatId="colorful" phldr="1"/>
       <dgm:spPr/>
       <dgm:t>
         <a:bodyPr/>
@@ -1067,7 +1067,14 @@
     </dgm:pt>
     <dgm:pt modelId="{E285215F-F7D3-426D-869F-A205F1C4BF2E}">
       <dgm:prSet phldrT="[Text]" custT="1"/>
-      <dgm:spPr/>
+      <dgm:spPr>
+        <a:ln w="15875">
+          <a:solidFill>
+            <a:schemeClr val="tx1"/>
+          </a:solidFill>
+          <a:prstDash val="solid"/>
+        </a:ln>
+      </dgm:spPr>
       <dgm:t>
         <a:bodyPr lIns="0" tIns="0" rIns="0" bIns="0" anchor="ctr"/>
         <a:lstStyle/>
@@ -1106,7 +1113,14 @@
     </dgm:pt>
     <dgm:pt modelId="{13BDC813-0B90-48F6-A0DA-2BF83E4323AC}">
       <dgm:prSet phldrT="[Text]"/>
-      <dgm:spPr/>
+      <dgm:spPr>
+        <a:ln w="15875">
+          <a:solidFill>
+            <a:schemeClr val="tx1"/>
+          </a:solidFill>
+          <a:prstDash val="solid"/>
+        </a:ln>
+      </dgm:spPr>
       <dgm:t>
         <a:bodyPr/>
         <a:lstStyle/>
@@ -1117,7 +1131,16 @@
     </dgm:pt>
     <dgm:pt modelId="{E8090202-8229-492D-BC32-089543CCF403}" type="parTrans" cxnId="{4E45A5E4-3491-4C53-85D5-EB0A6F589374}">
       <dgm:prSet/>
-      <dgm:spPr/>
+      <dgm:spPr>
+        <a:ln w="12700">
+          <a:solidFill>
+            <a:schemeClr val="tx1"/>
+          </a:solidFill>
+          <a:round/>
+          <a:headEnd type="none" w="lg" len="lg"/>
+          <a:tailEnd type="triangle" w="lg" len="lg"/>
+        </a:ln>
+      </dgm:spPr>
       <dgm:t>
         <a:bodyPr/>
         <a:lstStyle/>
@@ -1139,7 +1162,14 @@
     </dgm:pt>
     <dgm:pt modelId="{B69C2618-690B-42BD-8094-89775B7AB89D}">
       <dgm:prSet phldrT="[Text]"/>
-      <dgm:spPr/>
+      <dgm:spPr>
+        <a:ln w="15875">
+          <a:solidFill>
+            <a:schemeClr val="tx1"/>
+          </a:solidFill>
+          <a:prstDash val="solid"/>
+        </a:ln>
+      </dgm:spPr>
       <dgm:t>
         <a:bodyPr/>
         <a:lstStyle/>
@@ -1150,7 +1180,16 @@
     </dgm:pt>
     <dgm:pt modelId="{42D28648-708A-480E-87B5-ED6BB14FCE43}" type="parTrans" cxnId="{A63ACAD1-AF14-454B-8F2D-1BB2DA64D7F5}">
       <dgm:prSet/>
-      <dgm:spPr/>
+      <dgm:spPr>
+        <a:ln w="12700">
+          <a:solidFill>
+            <a:schemeClr val="tx1"/>
+          </a:solidFill>
+          <a:round/>
+          <a:headEnd type="none" w="lg" len="lg"/>
+          <a:tailEnd type="triangle" w="lg" len="lg"/>
+        </a:ln>
+      </dgm:spPr>
       <dgm:t>
         <a:bodyPr/>
         <a:lstStyle/>
@@ -1172,7 +1211,37 @@
     </dgm:pt>
     <dgm:pt modelId="{01ABCA04-BD82-4076-B9BE-56A01E6D25B7}">
       <dgm:prSet phldrT="[Text]"/>
-      <dgm:spPr/>
+      <dgm:spPr>
+        <a:gradFill rotWithShape="0">
+          <a:gsLst>
+            <a:gs pos="0">
+              <a:schemeClr val="accent5">
+                <a:hueOff val="0"/>
+                <a:satOff val="0"/>
+                <a:lumOff val="0"/>
+                <a:alphaOff val="0"/>
+              </a:schemeClr>
+            </a:gs>
+            <a:gs pos="100000">
+              <a:schemeClr val="accent5">
+                <a:hueOff val="0"/>
+                <a:satOff val="0"/>
+                <a:lumOff val="0"/>
+                <a:alphaOff val="0"/>
+                <a:shade val="76000"/>
+                <a:lumMod val="90000"/>
+              </a:schemeClr>
+            </a:gs>
+          </a:gsLst>
+          <a:lin ang="5400000" scaled="0"/>
+        </a:gradFill>
+        <a:ln w="15875">
+          <a:solidFill>
+            <a:schemeClr val="tx1"/>
+          </a:solidFill>
+          <a:prstDash val="solid"/>
+        </a:ln>
+      </dgm:spPr>
       <dgm:t>
         <a:bodyPr/>
         <a:lstStyle/>
@@ -1183,7 +1252,16 @@
     </dgm:pt>
     <dgm:pt modelId="{CC34B6BB-23B2-49FD-A406-648B3086DF41}" type="parTrans" cxnId="{03F4B17E-2D55-43A0-9BF1-80251250F7BC}">
       <dgm:prSet/>
-      <dgm:spPr/>
+      <dgm:spPr>
+        <a:ln w="12700">
+          <a:solidFill>
+            <a:schemeClr val="tx1"/>
+          </a:solidFill>
+          <a:round/>
+          <a:headEnd type="none" w="lg" len="lg"/>
+          <a:tailEnd type="triangle" w="lg" len="lg"/>
+        </a:ln>
+      </dgm:spPr>
       <dgm:t>
         <a:bodyPr/>
         <a:lstStyle/>
@@ -1205,7 +1283,14 @@
     </dgm:pt>
     <dgm:pt modelId="{D68FB0A1-64AF-4719-89C0-1735534AEBB3}">
       <dgm:prSet phldrT="[Text]"/>
-      <dgm:spPr/>
+      <dgm:spPr>
+        <a:ln w="15875">
+          <a:solidFill>
+            <a:schemeClr val="tx1"/>
+          </a:solidFill>
+          <a:prstDash val="solid"/>
+        </a:ln>
+      </dgm:spPr>
       <dgm:t>
         <a:bodyPr/>
         <a:lstStyle/>
@@ -1216,7 +1301,16 @@
     </dgm:pt>
     <dgm:pt modelId="{97BDDB0E-7BB4-40F0-B54F-BD037FA1B902}" type="parTrans" cxnId="{5D2E581C-9A3C-4C7B-8DB9-0B388BCA1B6F}">
       <dgm:prSet/>
-      <dgm:spPr/>
+      <dgm:spPr>
+        <a:ln w="12700">
+          <a:solidFill>
+            <a:schemeClr val="tx1"/>
+          </a:solidFill>
+          <a:round/>
+          <a:headEnd type="none" w="lg" len="lg"/>
+          <a:tailEnd type="triangle" w="lg" len="lg"/>
+        </a:ln>
+      </dgm:spPr>
       <dgm:t>
         <a:bodyPr/>
         <a:lstStyle/>
@@ -1238,7 +1332,14 @@
     </dgm:pt>
     <dgm:pt modelId="{2D019032-8DF9-427F-9EED-A44F575B2797}">
       <dgm:prSet phldrT="[Text]" custT="1"/>
-      <dgm:spPr/>
+      <dgm:spPr>
+        <a:ln w="15875">
+          <a:solidFill>
+            <a:schemeClr val="tx1"/>
+          </a:solidFill>
+          <a:prstDash val="solid"/>
+        </a:ln>
+      </dgm:spPr>
       <dgm:t>
         <a:bodyPr/>
         <a:lstStyle/>
@@ -1260,7 +1361,16 @@
     </dgm:pt>
     <dgm:pt modelId="{8AA4E754-3065-44F5-9AA8-EF9AEDF6D0CC}" type="parTrans" cxnId="{D9DDA6FC-B3AF-42F0-885F-BC9324E7B391}">
       <dgm:prSet/>
-      <dgm:spPr/>
+      <dgm:spPr>
+        <a:ln w="12700">
+          <a:solidFill>
+            <a:schemeClr val="tx1"/>
+          </a:solidFill>
+          <a:round/>
+          <a:headEnd type="none" w="lg" len="lg"/>
+          <a:tailEnd type="triangle" w="lg" len="lg"/>
+        </a:ln>
+      </dgm:spPr>
       <dgm:t>
         <a:bodyPr/>
         <a:lstStyle/>
@@ -1485,29 +1595,29 @@
     </dgm:pt>
   </dgm:ptLst>
   <dgm:cxnLst>
+    <dgm:cxn modelId="{1EC265EC-6DEF-4609-A98A-B9CCB15258B3}" type="presOf" srcId="{D68FB0A1-64AF-4719-89C0-1735534AEBB3}" destId="{689B2ECA-B910-4525-96D0-2E5738D025FB}" srcOrd="0" destOrd="0" presId="urn:microsoft.com/office/officeart/2005/8/layout/radial1"/>
+    <dgm:cxn modelId="{17C1CA81-EFCF-4500-99A2-70B48D403800}" type="presOf" srcId="{E8090202-8229-492D-BC32-089543CCF403}" destId="{0A0683A7-FFDC-4669-BD40-6CB23803F38E}" srcOrd="1" destOrd="0" presId="urn:microsoft.com/office/officeart/2005/8/layout/radial1"/>
+    <dgm:cxn modelId="{DDC635BF-E9FF-4F6A-BAEB-227541F64C87}" type="presOf" srcId="{8AA4E754-3065-44F5-9AA8-EF9AEDF6D0CC}" destId="{54647140-69E4-41A6-A8C6-AB935EBE7A65}" srcOrd="0" destOrd="0" presId="urn:microsoft.com/office/officeart/2005/8/layout/radial1"/>
+    <dgm:cxn modelId="{D9DDA6FC-B3AF-42F0-885F-BC9324E7B391}" srcId="{E285215F-F7D3-426D-869F-A205F1C4BF2E}" destId="{2D019032-8DF9-427F-9EED-A44F575B2797}" srcOrd="0" destOrd="0" parTransId="{8AA4E754-3065-44F5-9AA8-EF9AEDF6D0CC}" sibTransId="{30EE830B-DF74-41F0-84DB-53F31DAABAD3}"/>
     <dgm:cxn modelId="{565C1A81-D57D-4582-97F9-EBA3B9C066AA}" type="presOf" srcId="{42D28648-708A-480E-87B5-ED6BB14FCE43}" destId="{004EB149-5DCA-4BB3-966A-0CD4E4B3D794}" srcOrd="0" destOrd="0" presId="urn:microsoft.com/office/officeart/2005/8/layout/radial1"/>
+    <dgm:cxn modelId="{CB7DF784-AF03-4345-92B8-EA0334A5B7FE}" type="presOf" srcId="{97BDDB0E-7BB4-40F0-B54F-BD037FA1B902}" destId="{2EC2BD0D-C97D-41AD-AE96-03BDFEBCF029}" srcOrd="1" destOrd="0" presId="urn:microsoft.com/office/officeart/2005/8/layout/radial1"/>
+    <dgm:cxn modelId="{477001B9-F0FC-4A08-B9D6-C0281089D8F3}" type="presOf" srcId="{97BDDB0E-7BB4-40F0-B54F-BD037FA1B902}" destId="{B3663269-5A54-41DC-AC8E-9D1288DD3DD7}" srcOrd="0" destOrd="0" presId="urn:microsoft.com/office/officeart/2005/8/layout/radial1"/>
+    <dgm:cxn modelId="{23D40415-107F-48A9-A42D-6F72DA38CB6D}" type="presOf" srcId="{13BDC813-0B90-48F6-A0DA-2BF83E4323AC}" destId="{4478A666-3F40-47DC-9706-1A123FB90CD7}" srcOrd="0" destOrd="0" presId="urn:microsoft.com/office/officeart/2005/8/layout/radial1"/>
+    <dgm:cxn modelId="{24AC7777-6A48-452C-B7AA-D17274B7F8EB}" type="presOf" srcId="{CC34B6BB-23B2-49FD-A406-648B3086DF41}" destId="{523B1C70-F75A-4619-9182-0CA1139F6CA0}" srcOrd="0" destOrd="0" presId="urn:microsoft.com/office/officeart/2005/8/layout/radial1"/>
+    <dgm:cxn modelId="{5D2E581C-9A3C-4C7B-8DB9-0B388BCA1B6F}" srcId="{E285215F-F7D3-426D-869F-A205F1C4BF2E}" destId="{D68FB0A1-64AF-4719-89C0-1735534AEBB3}" srcOrd="4" destOrd="0" parTransId="{97BDDB0E-7BB4-40F0-B54F-BD037FA1B902}" sibTransId="{CA0EB4F4-2857-4F3B-B099-390373A5912F}"/>
+    <dgm:cxn modelId="{4E45A5E4-3491-4C53-85D5-EB0A6F589374}" srcId="{E285215F-F7D3-426D-869F-A205F1C4BF2E}" destId="{13BDC813-0B90-48F6-A0DA-2BF83E4323AC}" srcOrd="1" destOrd="0" parTransId="{E8090202-8229-492D-BC32-089543CCF403}" sibTransId="{430D8C41-AA6A-488F-A2C6-FE86BBA67565}"/>
+    <dgm:cxn modelId="{712F59E6-9F77-49BE-896E-6AB661489231}" srcId="{A50B2181-E5A6-44A1-8756-379E11E86230}" destId="{E285215F-F7D3-426D-869F-A205F1C4BF2E}" srcOrd="0" destOrd="0" parTransId="{C88ED351-B087-4B5B-B036-8A79F85B9430}" sibTransId="{8F134DCA-F37E-4B6B-8D99-CDA93A04CBF7}"/>
+    <dgm:cxn modelId="{F4F38749-FD85-4867-9022-FCD6131FC5C9}" type="presOf" srcId="{8AA4E754-3065-44F5-9AA8-EF9AEDF6D0CC}" destId="{93D91C59-4B1B-4428-99CC-CD38ED6D35DF}" srcOrd="1" destOrd="0" presId="urn:microsoft.com/office/officeart/2005/8/layout/radial1"/>
+    <dgm:cxn modelId="{55AF4365-46C2-4A68-B77B-BFAE3D99A20C}" type="presOf" srcId="{E285215F-F7D3-426D-869F-A205F1C4BF2E}" destId="{72F65768-CD9D-4B58-9D5F-6AF83E4586D6}" srcOrd="0" destOrd="0" presId="urn:microsoft.com/office/officeart/2005/8/layout/radial1"/>
+    <dgm:cxn modelId="{11858779-D06B-4BA4-B52E-C96B8437B1B6}" type="presOf" srcId="{E8090202-8229-492D-BC32-089543CCF403}" destId="{5CFD2702-8B4E-448D-9A07-BA386B2BDABF}" srcOrd="0" destOrd="0" presId="urn:microsoft.com/office/officeart/2005/8/layout/radial1"/>
+    <dgm:cxn modelId="{2C7AB0CE-C562-4F57-BE01-54AC6FF13837}" type="presOf" srcId="{2D019032-8DF9-427F-9EED-A44F575B2797}" destId="{413CE0EE-DEA9-4DCD-BDC4-1C706C61D460}" srcOrd="0" destOrd="0" presId="urn:microsoft.com/office/officeart/2005/8/layout/radial1"/>
+    <dgm:cxn modelId="{03F4B17E-2D55-43A0-9BF1-80251250F7BC}" srcId="{E285215F-F7D3-426D-869F-A205F1C4BF2E}" destId="{01ABCA04-BD82-4076-B9BE-56A01E6D25B7}" srcOrd="3" destOrd="0" parTransId="{CC34B6BB-23B2-49FD-A406-648B3086DF41}" sibTransId="{D16D7ECD-6375-4618-9E03-47DC25F83BF1}"/>
     <dgm:cxn modelId="{E7172AC7-3685-4A76-B8D9-73307D393D38}" type="presOf" srcId="{CC34B6BB-23B2-49FD-A406-648B3086DF41}" destId="{6C30350E-651F-4A6F-AC14-83A298240A49}" srcOrd="1" destOrd="0" presId="urn:microsoft.com/office/officeart/2005/8/layout/radial1"/>
-    <dgm:cxn modelId="{F4F38749-FD85-4867-9022-FCD6131FC5C9}" type="presOf" srcId="{8AA4E754-3065-44F5-9AA8-EF9AEDF6D0CC}" destId="{93D91C59-4B1B-4428-99CC-CD38ED6D35DF}" srcOrd="1" destOrd="0" presId="urn:microsoft.com/office/officeart/2005/8/layout/radial1"/>
-    <dgm:cxn modelId="{24AC7777-6A48-452C-B7AA-D17274B7F8EB}" type="presOf" srcId="{CC34B6BB-23B2-49FD-A406-648B3086DF41}" destId="{523B1C70-F75A-4619-9182-0CA1139F6CA0}" srcOrd="0" destOrd="0" presId="urn:microsoft.com/office/officeart/2005/8/layout/radial1"/>
-    <dgm:cxn modelId="{03F4B17E-2D55-43A0-9BF1-80251250F7BC}" srcId="{E285215F-F7D3-426D-869F-A205F1C4BF2E}" destId="{01ABCA04-BD82-4076-B9BE-56A01E6D25B7}" srcOrd="3" destOrd="0" parTransId="{CC34B6BB-23B2-49FD-A406-648B3086DF41}" sibTransId="{D16D7ECD-6375-4618-9E03-47DC25F83BF1}"/>
+    <dgm:cxn modelId="{64AAB6DC-AED8-4B7B-B4FC-427086EA9A8F}" type="presOf" srcId="{01ABCA04-BD82-4076-B9BE-56A01E6D25B7}" destId="{8DF26142-863A-4361-A75A-660F7E95FF6B}" srcOrd="0" destOrd="0" presId="urn:microsoft.com/office/officeart/2005/8/layout/radial1"/>
+    <dgm:cxn modelId="{0823DF6B-4D18-49B8-B035-B9CC9AB86052}" type="presOf" srcId="{B69C2618-690B-42BD-8094-89775B7AB89D}" destId="{3ED18D1C-2396-4751-93D8-F6C161B378DD}" srcOrd="0" destOrd="0" presId="urn:microsoft.com/office/officeart/2005/8/layout/radial1"/>
+    <dgm:cxn modelId="{26C96D0E-B60E-492D-B5C7-D2E138BFBB59}" type="presOf" srcId="{A50B2181-E5A6-44A1-8756-379E11E86230}" destId="{1C206003-3862-42FC-8D0D-5CB969C4D4D5}" srcOrd="0" destOrd="0" presId="urn:microsoft.com/office/officeart/2005/8/layout/radial1"/>
+    <dgm:cxn modelId="{784B2428-8BED-480B-82EB-78A5DA5FBF09}" type="presOf" srcId="{42D28648-708A-480E-87B5-ED6BB14FCE43}" destId="{B1CC1C9D-109B-4BE0-BB0C-6AFEF4A7F041}" srcOrd="1" destOrd="0" presId="urn:microsoft.com/office/officeart/2005/8/layout/radial1"/>
     <dgm:cxn modelId="{A63ACAD1-AF14-454B-8F2D-1BB2DA64D7F5}" srcId="{E285215F-F7D3-426D-869F-A205F1C4BF2E}" destId="{B69C2618-690B-42BD-8094-89775B7AB89D}" srcOrd="2" destOrd="0" parTransId="{42D28648-708A-480E-87B5-ED6BB14FCE43}" sibTransId="{D590987A-3E82-41C4-96C2-43795618FC36}"/>
-    <dgm:cxn modelId="{17C1CA81-EFCF-4500-99A2-70B48D403800}" type="presOf" srcId="{E8090202-8229-492D-BC32-089543CCF403}" destId="{0A0683A7-FFDC-4669-BD40-6CB23803F38E}" srcOrd="1" destOrd="0" presId="urn:microsoft.com/office/officeart/2005/8/layout/radial1"/>
-    <dgm:cxn modelId="{23D40415-107F-48A9-A42D-6F72DA38CB6D}" type="presOf" srcId="{13BDC813-0B90-48F6-A0DA-2BF83E4323AC}" destId="{4478A666-3F40-47DC-9706-1A123FB90CD7}" srcOrd="0" destOrd="0" presId="urn:microsoft.com/office/officeart/2005/8/layout/radial1"/>
-    <dgm:cxn modelId="{11858779-D06B-4BA4-B52E-C96B8437B1B6}" type="presOf" srcId="{E8090202-8229-492D-BC32-089543CCF403}" destId="{5CFD2702-8B4E-448D-9A07-BA386B2BDABF}" srcOrd="0" destOrd="0" presId="urn:microsoft.com/office/officeart/2005/8/layout/radial1"/>
-    <dgm:cxn modelId="{477001B9-F0FC-4A08-B9D6-C0281089D8F3}" type="presOf" srcId="{97BDDB0E-7BB4-40F0-B54F-BD037FA1B902}" destId="{B3663269-5A54-41DC-AC8E-9D1288DD3DD7}" srcOrd="0" destOrd="0" presId="urn:microsoft.com/office/officeart/2005/8/layout/radial1"/>
-    <dgm:cxn modelId="{1EC265EC-6DEF-4609-A98A-B9CCB15258B3}" type="presOf" srcId="{D68FB0A1-64AF-4719-89C0-1735534AEBB3}" destId="{689B2ECA-B910-4525-96D0-2E5738D025FB}" srcOrd="0" destOrd="0" presId="urn:microsoft.com/office/officeart/2005/8/layout/radial1"/>
-    <dgm:cxn modelId="{0823DF6B-4D18-49B8-B035-B9CC9AB86052}" type="presOf" srcId="{B69C2618-690B-42BD-8094-89775B7AB89D}" destId="{3ED18D1C-2396-4751-93D8-F6C161B378DD}" srcOrd="0" destOrd="0" presId="urn:microsoft.com/office/officeart/2005/8/layout/radial1"/>
-    <dgm:cxn modelId="{64AAB6DC-AED8-4B7B-B4FC-427086EA9A8F}" type="presOf" srcId="{01ABCA04-BD82-4076-B9BE-56A01E6D25B7}" destId="{8DF26142-863A-4361-A75A-660F7E95FF6B}" srcOrd="0" destOrd="0" presId="urn:microsoft.com/office/officeart/2005/8/layout/radial1"/>
-    <dgm:cxn modelId="{4E45A5E4-3491-4C53-85D5-EB0A6F589374}" srcId="{E285215F-F7D3-426D-869F-A205F1C4BF2E}" destId="{13BDC813-0B90-48F6-A0DA-2BF83E4323AC}" srcOrd="1" destOrd="0" parTransId="{E8090202-8229-492D-BC32-089543CCF403}" sibTransId="{430D8C41-AA6A-488F-A2C6-FE86BBA67565}"/>
-    <dgm:cxn modelId="{26C96D0E-B60E-492D-B5C7-D2E138BFBB59}" type="presOf" srcId="{A50B2181-E5A6-44A1-8756-379E11E86230}" destId="{1C206003-3862-42FC-8D0D-5CB969C4D4D5}" srcOrd="0" destOrd="0" presId="urn:microsoft.com/office/officeart/2005/8/layout/radial1"/>
-    <dgm:cxn modelId="{D9DDA6FC-B3AF-42F0-885F-BC9324E7B391}" srcId="{E285215F-F7D3-426D-869F-A205F1C4BF2E}" destId="{2D019032-8DF9-427F-9EED-A44F575B2797}" srcOrd="0" destOrd="0" parTransId="{8AA4E754-3065-44F5-9AA8-EF9AEDF6D0CC}" sibTransId="{30EE830B-DF74-41F0-84DB-53F31DAABAD3}"/>
-    <dgm:cxn modelId="{DDC635BF-E9FF-4F6A-BAEB-227541F64C87}" type="presOf" srcId="{8AA4E754-3065-44F5-9AA8-EF9AEDF6D0CC}" destId="{54647140-69E4-41A6-A8C6-AB935EBE7A65}" srcOrd="0" destOrd="0" presId="urn:microsoft.com/office/officeart/2005/8/layout/radial1"/>
-    <dgm:cxn modelId="{CB7DF784-AF03-4345-92B8-EA0334A5B7FE}" type="presOf" srcId="{97BDDB0E-7BB4-40F0-B54F-BD037FA1B902}" destId="{2EC2BD0D-C97D-41AD-AE96-03BDFEBCF029}" srcOrd="1" destOrd="0" presId="urn:microsoft.com/office/officeart/2005/8/layout/radial1"/>
-    <dgm:cxn modelId="{55AF4365-46C2-4A68-B77B-BFAE3D99A20C}" type="presOf" srcId="{E285215F-F7D3-426D-869F-A205F1C4BF2E}" destId="{72F65768-CD9D-4B58-9D5F-6AF83E4586D6}" srcOrd="0" destOrd="0" presId="urn:microsoft.com/office/officeart/2005/8/layout/radial1"/>
-    <dgm:cxn modelId="{784B2428-8BED-480B-82EB-78A5DA5FBF09}" type="presOf" srcId="{42D28648-708A-480E-87B5-ED6BB14FCE43}" destId="{B1CC1C9D-109B-4BE0-BB0C-6AFEF4A7F041}" srcOrd="1" destOrd="0" presId="urn:microsoft.com/office/officeart/2005/8/layout/radial1"/>
-    <dgm:cxn modelId="{2C7AB0CE-C562-4F57-BE01-54AC6FF13837}" type="presOf" srcId="{2D019032-8DF9-427F-9EED-A44F575B2797}" destId="{413CE0EE-DEA9-4DCD-BDC4-1C706C61D460}" srcOrd="0" destOrd="0" presId="urn:microsoft.com/office/officeart/2005/8/layout/radial1"/>
-    <dgm:cxn modelId="{5D2E581C-9A3C-4C7B-8DB9-0B388BCA1B6F}" srcId="{E285215F-F7D3-426D-869F-A205F1C4BF2E}" destId="{D68FB0A1-64AF-4719-89C0-1735534AEBB3}" srcOrd="4" destOrd="0" parTransId="{97BDDB0E-7BB4-40F0-B54F-BD037FA1B902}" sibTransId="{CA0EB4F4-2857-4F3B-B099-390373A5912F}"/>
-    <dgm:cxn modelId="{712F59E6-9F77-49BE-896E-6AB661489231}" srcId="{A50B2181-E5A6-44A1-8756-379E11E86230}" destId="{E285215F-F7D3-426D-869F-A205F1C4BF2E}" srcOrd="0" destOrd="0" parTransId="{C88ED351-B087-4B5B-B036-8A79F85B9430}" sibTransId="{8F134DCA-F37E-4B6B-8D99-CDA93A04CBF7}"/>
     <dgm:cxn modelId="{775D81D1-9D42-4D21-B024-BFC79916B2D5}" type="presParOf" srcId="{1C206003-3862-42FC-8D0D-5CB969C4D4D5}" destId="{72F65768-CD9D-4B58-9D5F-6AF83E4586D6}" srcOrd="0" destOrd="0" presId="urn:microsoft.com/office/officeart/2005/8/layout/radial1"/>
     <dgm:cxn modelId="{A295FC39-0FCE-4B55-8C3E-9DED14FFE44D}" type="presParOf" srcId="{1C206003-3862-42FC-8D0D-5CB969C4D4D5}" destId="{54647140-69E4-41A6-A8C6-AB935EBE7A65}" srcOrd="1" destOrd="0" presId="urn:microsoft.com/office/officeart/2005/8/layout/radial1"/>
     <dgm:cxn modelId="{8FCAFA63-97DE-4E21-B4CA-307007B2B200}" type="presParOf" srcId="{54647140-69E4-41A6-A8C6-AB935EBE7A65}" destId="{93D91C59-4B1B-4428-99CC-CD38ED6D35DF}" srcOrd="0" destOrd="0" presId="urn:microsoft.com/office/officeart/2005/8/layout/radial1"/>
@@ -1525,8 +1635,19 @@
     <dgm:cxn modelId="{D67056E6-F6C5-4AE6-AEC9-9D9BE692DCB3}" type="presParOf" srcId="{B3663269-5A54-41DC-AC8E-9D1288DD3DD7}" destId="{2EC2BD0D-C97D-41AD-AE96-03BDFEBCF029}" srcOrd="0" destOrd="0" presId="urn:microsoft.com/office/officeart/2005/8/layout/radial1"/>
     <dgm:cxn modelId="{A16AA862-94D0-4D62-BDFF-F926A91631BE}" type="presParOf" srcId="{1C206003-3862-42FC-8D0D-5CB969C4D4D5}" destId="{689B2ECA-B910-4525-96D0-2E5738D025FB}" srcOrd="10" destOrd="0" presId="urn:microsoft.com/office/officeart/2005/8/layout/radial1"/>
   </dgm:cxnLst>
-  <dgm:bg/>
-  <dgm:whole/>
+  <dgm:bg>
+    <a:noFill/>
+    <a:effectLst/>
+  </dgm:bg>
+  <dgm:whole>
+    <a:ln w="9525" cap="flat" cmpd="sng" algn="ctr">
+      <a:noFill/>
+      <a:prstDash val="solid"/>
+      <a:round/>
+      <a:headEnd type="none" w="med" len="med"/>
+      <a:tailEnd type="none" w="med" len="med"/>
+    </a:ln>
+  </dgm:whole>
   <dgm:extLst>
     <a:ext uri="http://schemas.microsoft.com/office/drawing/2008/diagram">
       <dsp:dataModelExt xmlns:dsp="http://schemas.microsoft.com/office/drawing/2008/diagram" relId="rId6" minVer="http://schemas.openxmlformats.org/drawingml/2006/diagram"/>
@@ -1556,35 +1677,51 @@
         <a:prstGeom prst="ellipse">
           <a:avLst/>
         </a:prstGeom>
-        <a:solidFill>
-          <a:schemeClr val="accent1">
-            <a:hueOff val="0"/>
-            <a:satOff val="0"/>
-            <a:lumOff val="0"/>
-            <a:alphaOff val="0"/>
-          </a:schemeClr>
-        </a:solidFill>
-        <a:ln w="15875" cap="flat" cmpd="sng" algn="ctr">
+        <a:gradFill rotWithShape="0">
+          <a:gsLst>
+            <a:gs pos="0">
+              <a:schemeClr val="accent1">
+                <a:hueOff val="0"/>
+                <a:satOff val="0"/>
+                <a:lumOff val="0"/>
+                <a:alphaOff val="0"/>
+              </a:schemeClr>
+            </a:gs>
+            <a:gs pos="100000">
+              <a:schemeClr val="accent1">
+                <a:hueOff val="0"/>
+                <a:satOff val="0"/>
+                <a:lumOff val="0"/>
+                <a:alphaOff val="0"/>
+                <a:shade val="76000"/>
+                <a:lumMod val="90000"/>
+              </a:schemeClr>
+            </a:gs>
+          </a:gsLst>
+          <a:lin ang="5400000" scaled="0"/>
+        </a:gradFill>
+        <a:ln w="15875">
           <a:solidFill>
-            <a:schemeClr val="lt1">
-              <a:hueOff val="0"/>
-              <a:satOff val="0"/>
-              <a:lumOff val="0"/>
-              <a:alphaOff val="0"/>
-            </a:schemeClr>
+            <a:schemeClr val="tx1"/>
           </a:solidFill>
           <a:prstDash val="solid"/>
         </a:ln>
-        <a:effectLst/>
+        <a:effectLst>
+          <a:outerShdw blurRad="38100" dist="38100" dir="4800000" sx="98000" sy="98000" rotWithShape="0">
+            <a:srgbClr val="000000">
+              <a:alpha val="32000"/>
+            </a:srgbClr>
+          </a:outerShdw>
+        </a:effectLst>
       </dsp:spPr>
       <dsp:style>
-        <a:lnRef idx="2">
+        <a:lnRef idx="0">
           <a:scrgbClr r="0" g="0" b="0"/>
         </a:lnRef>
-        <a:fillRef idx="1">
+        <a:fillRef idx="3">
           <a:scrgbClr r="0" g="0" b="0"/>
         </a:fillRef>
-        <a:effectRef idx="0">
+        <a:effectRef idx="2">
           <a:scrgbClr r="0" g="0" b="0"/>
         </a:effectRef>
         <a:fontRef idx="minor">
@@ -1649,21 +1786,19 @@
           </a:pathLst>
         </a:custGeom>
         <a:noFill/>
-        <a:ln w="15875" cap="flat" cmpd="sng" algn="ctr">
+        <a:ln w="12700" cap="flat" cmpd="sng" algn="ctr">
           <a:solidFill>
-            <a:schemeClr val="accent2">
-              <a:hueOff val="0"/>
-              <a:satOff val="0"/>
-              <a:lumOff val="0"/>
-              <a:alphaOff val="0"/>
-            </a:schemeClr>
+            <a:schemeClr val="tx1"/>
           </a:solidFill>
           <a:prstDash val="solid"/>
+          <a:round/>
+          <a:headEnd type="none" w="lg" len="lg"/>
+          <a:tailEnd type="triangle" w="lg" len="lg"/>
         </a:ln>
         <a:effectLst/>
       </dsp:spPr>
       <dsp:style>
-        <a:lnRef idx="2">
+        <a:lnRef idx="1">
           <a:scrgbClr r="0" g="0" b="0"/>
         </a:lnRef>
         <a:fillRef idx="0">
@@ -1712,35 +1847,51 @@
         <a:prstGeom prst="ellipse">
           <a:avLst/>
         </a:prstGeom>
-        <a:solidFill>
-          <a:schemeClr val="accent2">
-            <a:hueOff val="0"/>
-            <a:satOff val="0"/>
-            <a:lumOff val="0"/>
-            <a:alphaOff val="0"/>
-          </a:schemeClr>
-        </a:solidFill>
-        <a:ln w="15875" cap="flat" cmpd="sng" algn="ctr">
+        <a:gradFill rotWithShape="0">
+          <a:gsLst>
+            <a:gs pos="0">
+              <a:schemeClr val="accent2">
+                <a:hueOff val="0"/>
+                <a:satOff val="0"/>
+                <a:lumOff val="0"/>
+                <a:alphaOff val="0"/>
+              </a:schemeClr>
+            </a:gs>
+            <a:gs pos="100000">
+              <a:schemeClr val="accent2">
+                <a:hueOff val="0"/>
+                <a:satOff val="0"/>
+                <a:lumOff val="0"/>
+                <a:alphaOff val="0"/>
+                <a:shade val="76000"/>
+                <a:lumMod val="90000"/>
+              </a:schemeClr>
+            </a:gs>
+          </a:gsLst>
+          <a:lin ang="5400000" scaled="0"/>
+        </a:gradFill>
+        <a:ln w="15875">
           <a:solidFill>
-            <a:schemeClr val="lt1">
-              <a:hueOff val="0"/>
-              <a:satOff val="0"/>
-              <a:lumOff val="0"/>
-              <a:alphaOff val="0"/>
-            </a:schemeClr>
+            <a:schemeClr val="tx1"/>
           </a:solidFill>
           <a:prstDash val="solid"/>
         </a:ln>
-        <a:effectLst/>
+        <a:effectLst>
+          <a:outerShdw blurRad="38100" dist="38100" dir="4800000" sx="98000" sy="98000" rotWithShape="0">
+            <a:srgbClr val="000000">
+              <a:alpha val="32000"/>
+            </a:srgbClr>
+          </a:outerShdw>
+        </a:effectLst>
       </dsp:spPr>
       <dsp:style>
-        <a:lnRef idx="2">
+        <a:lnRef idx="0">
           <a:scrgbClr r="0" g="0" b="0"/>
         </a:lnRef>
-        <a:fillRef idx="1">
+        <a:fillRef idx="3">
           <a:scrgbClr r="0" g="0" b="0"/>
         </a:fillRef>
-        <a:effectRef idx="0">
+        <a:effectRef idx="2">
           <a:scrgbClr r="0" g="0" b="0"/>
         </a:effectRef>
         <a:fontRef idx="minor">
@@ -1800,21 +1951,19 @@
           </a:pathLst>
         </a:custGeom>
         <a:noFill/>
-        <a:ln w="15875" cap="flat" cmpd="sng" algn="ctr">
+        <a:ln w="12700" cap="flat" cmpd="sng" algn="ctr">
           <a:solidFill>
-            <a:schemeClr val="accent2">
-              <a:hueOff val="0"/>
-              <a:satOff val="0"/>
-              <a:lumOff val="0"/>
-              <a:alphaOff val="0"/>
-            </a:schemeClr>
+            <a:schemeClr val="tx1"/>
           </a:solidFill>
           <a:prstDash val="solid"/>
+          <a:round/>
+          <a:headEnd type="none" w="lg" len="lg"/>
+          <a:tailEnd type="triangle" w="lg" len="lg"/>
         </a:ln>
         <a:effectLst/>
       </dsp:spPr>
       <dsp:style>
-        <a:lnRef idx="2">
+        <a:lnRef idx="1">
           <a:scrgbClr r="0" g="0" b="0"/>
         </a:lnRef>
         <a:fillRef idx="0">
@@ -1863,35 +2012,51 @@
         <a:prstGeom prst="ellipse">
           <a:avLst/>
         </a:prstGeom>
-        <a:solidFill>
-          <a:schemeClr val="accent3">
-            <a:hueOff val="0"/>
-            <a:satOff val="0"/>
-            <a:lumOff val="0"/>
-            <a:alphaOff val="0"/>
-          </a:schemeClr>
-        </a:solidFill>
-        <a:ln w="15875" cap="flat" cmpd="sng" algn="ctr">
+        <a:gradFill rotWithShape="0">
+          <a:gsLst>
+            <a:gs pos="0">
+              <a:schemeClr val="accent3">
+                <a:hueOff val="0"/>
+                <a:satOff val="0"/>
+                <a:lumOff val="0"/>
+                <a:alphaOff val="0"/>
+              </a:schemeClr>
+            </a:gs>
+            <a:gs pos="100000">
+              <a:schemeClr val="accent3">
+                <a:hueOff val="0"/>
+                <a:satOff val="0"/>
+                <a:lumOff val="0"/>
+                <a:alphaOff val="0"/>
+                <a:shade val="76000"/>
+                <a:lumMod val="90000"/>
+              </a:schemeClr>
+            </a:gs>
+          </a:gsLst>
+          <a:lin ang="5400000" scaled="0"/>
+        </a:gradFill>
+        <a:ln w="15875">
           <a:solidFill>
-            <a:schemeClr val="lt1">
-              <a:hueOff val="0"/>
-              <a:satOff val="0"/>
-              <a:lumOff val="0"/>
-              <a:alphaOff val="0"/>
-            </a:schemeClr>
+            <a:schemeClr val="tx1"/>
           </a:solidFill>
           <a:prstDash val="solid"/>
         </a:ln>
-        <a:effectLst/>
+        <a:effectLst>
+          <a:outerShdw blurRad="38100" dist="38100" dir="4800000" sx="98000" sy="98000" rotWithShape="0">
+            <a:srgbClr val="000000">
+              <a:alpha val="32000"/>
+            </a:srgbClr>
+          </a:outerShdw>
+        </a:effectLst>
       </dsp:spPr>
       <dsp:style>
-        <a:lnRef idx="2">
+        <a:lnRef idx="0">
           <a:scrgbClr r="0" g="0" b="0"/>
         </a:lnRef>
-        <a:fillRef idx="1">
+        <a:fillRef idx="3">
           <a:scrgbClr r="0" g="0" b="0"/>
         </a:fillRef>
-        <a:effectRef idx="0">
+        <a:effectRef idx="2">
           <a:scrgbClr r="0" g="0" b="0"/>
         </a:effectRef>
         <a:fontRef idx="minor">
@@ -1951,21 +2116,19 @@
           </a:pathLst>
         </a:custGeom>
         <a:noFill/>
-        <a:ln w="15875" cap="flat" cmpd="sng" algn="ctr">
+        <a:ln w="12700" cap="flat" cmpd="sng" algn="ctr">
           <a:solidFill>
-            <a:schemeClr val="accent2">
-              <a:hueOff val="0"/>
-              <a:satOff val="0"/>
-              <a:lumOff val="0"/>
-              <a:alphaOff val="0"/>
-            </a:schemeClr>
+            <a:schemeClr val="tx1"/>
           </a:solidFill>
           <a:prstDash val="solid"/>
+          <a:round/>
+          <a:headEnd type="none" w="lg" len="lg"/>
+          <a:tailEnd type="triangle" w="lg" len="lg"/>
         </a:ln>
         <a:effectLst/>
       </dsp:spPr>
       <dsp:style>
-        <a:lnRef idx="2">
+        <a:lnRef idx="1">
           <a:scrgbClr r="0" g="0" b="0"/>
         </a:lnRef>
         <a:fillRef idx="0">
@@ -2014,35 +2177,51 @@
         <a:prstGeom prst="ellipse">
           <a:avLst/>
         </a:prstGeom>
-        <a:solidFill>
-          <a:schemeClr val="accent4">
-            <a:hueOff val="0"/>
-            <a:satOff val="0"/>
-            <a:lumOff val="0"/>
-            <a:alphaOff val="0"/>
-          </a:schemeClr>
-        </a:solidFill>
-        <a:ln w="15875" cap="flat" cmpd="sng" algn="ctr">
+        <a:gradFill rotWithShape="0">
+          <a:gsLst>
+            <a:gs pos="0">
+              <a:schemeClr val="accent4">
+                <a:hueOff val="0"/>
+                <a:satOff val="0"/>
+                <a:lumOff val="0"/>
+                <a:alphaOff val="0"/>
+              </a:schemeClr>
+            </a:gs>
+            <a:gs pos="100000">
+              <a:schemeClr val="accent4">
+                <a:hueOff val="0"/>
+                <a:satOff val="0"/>
+                <a:lumOff val="0"/>
+                <a:alphaOff val="0"/>
+                <a:shade val="76000"/>
+                <a:lumMod val="90000"/>
+              </a:schemeClr>
+            </a:gs>
+          </a:gsLst>
+          <a:lin ang="5400000" scaled="0"/>
+        </a:gradFill>
+        <a:ln w="15875">
           <a:solidFill>
-            <a:schemeClr val="lt1">
-              <a:hueOff val="0"/>
-              <a:satOff val="0"/>
-              <a:lumOff val="0"/>
-              <a:alphaOff val="0"/>
-            </a:schemeClr>
+            <a:schemeClr val="tx1"/>
           </a:solidFill>
           <a:prstDash val="solid"/>
         </a:ln>
-        <a:effectLst/>
+        <a:effectLst>
+          <a:outerShdw blurRad="38100" dist="38100" dir="4800000" sx="98000" sy="98000" rotWithShape="0">
+            <a:srgbClr val="000000">
+              <a:alpha val="32000"/>
+            </a:srgbClr>
+          </a:outerShdw>
+        </a:effectLst>
       </dsp:spPr>
       <dsp:style>
-        <a:lnRef idx="2">
+        <a:lnRef idx="0">
           <a:scrgbClr r="0" g="0" b="0"/>
         </a:lnRef>
-        <a:fillRef idx="1">
+        <a:fillRef idx="3">
           <a:scrgbClr r="0" g="0" b="0"/>
         </a:fillRef>
-        <a:effectRef idx="0">
+        <a:effectRef idx="2">
           <a:scrgbClr r="0" g="0" b="0"/>
         </a:effectRef>
         <a:fontRef idx="minor">
@@ -2102,21 +2281,19 @@
           </a:pathLst>
         </a:custGeom>
         <a:noFill/>
-        <a:ln w="15875" cap="flat" cmpd="sng" algn="ctr">
+        <a:ln w="12700" cap="flat" cmpd="sng" algn="ctr">
           <a:solidFill>
-            <a:schemeClr val="accent2">
-              <a:hueOff val="0"/>
-              <a:satOff val="0"/>
-              <a:lumOff val="0"/>
-              <a:alphaOff val="0"/>
-            </a:schemeClr>
+            <a:schemeClr val="tx1"/>
           </a:solidFill>
           <a:prstDash val="solid"/>
+          <a:round/>
+          <a:headEnd type="none" w="lg" len="lg"/>
+          <a:tailEnd type="triangle" w="lg" len="lg"/>
         </a:ln>
         <a:effectLst/>
       </dsp:spPr>
       <dsp:style>
-        <a:lnRef idx="2">
+        <a:lnRef idx="1">
           <a:scrgbClr r="0" g="0" b="0"/>
         </a:lnRef>
         <a:fillRef idx="0">
@@ -2165,35 +2342,51 @@
         <a:prstGeom prst="ellipse">
           <a:avLst/>
         </a:prstGeom>
-        <a:solidFill>
-          <a:schemeClr val="accent5">
-            <a:hueOff val="0"/>
-            <a:satOff val="0"/>
-            <a:lumOff val="0"/>
-            <a:alphaOff val="0"/>
-          </a:schemeClr>
-        </a:solidFill>
-        <a:ln w="15875" cap="flat" cmpd="sng" algn="ctr">
+        <a:gradFill rotWithShape="0">
+          <a:gsLst>
+            <a:gs pos="0">
+              <a:schemeClr val="accent5">
+                <a:hueOff val="0"/>
+                <a:satOff val="0"/>
+                <a:lumOff val="0"/>
+                <a:alphaOff val="0"/>
+              </a:schemeClr>
+            </a:gs>
+            <a:gs pos="100000">
+              <a:schemeClr val="accent5">
+                <a:hueOff val="0"/>
+                <a:satOff val="0"/>
+                <a:lumOff val="0"/>
+                <a:alphaOff val="0"/>
+                <a:shade val="76000"/>
+                <a:lumMod val="90000"/>
+              </a:schemeClr>
+            </a:gs>
+          </a:gsLst>
+          <a:lin ang="5400000" scaled="0"/>
+        </a:gradFill>
+        <a:ln w="15875">
           <a:solidFill>
-            <a:schemeClr val="lt1">
-              <a:hueOff val="0"/>
-              <a:satOff val="0"/>
-              <a:lumOff val="0"/>
-              <a:alphaOff val="0"/>
-            </a:schemeClr>
+            <a:schemeClr val="tx1"/>
           </a:solidFill>
           <a:prstDash val="solid"/>
         </a:ln>
-        <a:effectLst/>
+        <a:effectLst>
+          <a:outerShdw blurRad="38100" dist="38100" dir="4800000" sx="98000" sy="98000" rotWithShape="0">
+            <a:srgbClr val="000000">
+              <a:alpha val="32000"/>
+            </a:srgbClr>
+          </a:outerShdw>
+        </a:effectLst>
       </dsp:spPr>
       <dsp:style>
-        <a:lnRef idx="2">
+        <a:lnRef idx="0">
           <a:scrgbClr r="0" g="0" b="0"/>
         </a:lnRef>
-        <a:fillRef idx="1">
+        <a:fillRef idx="3">
           <a:scrgbClr r="0" g="0" b="0"/>
         </a:fillRef>
-        <a:effectRef idx="0">
+        <a:effectRef idx="2">
           <a:scrgbClr r="0" g="0" b="0"/>
         </a:effectRef>
         <a:fontRef idx="minor">
@@ -2253,21 +2446,19 @@
           </a:pathLst>
         </a:custGeom>
         <a:noFill/>
-        <a:ln w="15875" cap="flat" cmpd="sng" algn="ctr">
+        <a:ln w="12700" cap="flat" cmpd="sng" algn="ctr">
           <a:solidFill>
-            <a:schemeClr val="accent2">
-              <a:hueOff val="0"/>
-              <a:satOff val="0"/>
-              <a:lumOff val="0"/>
-              <a:alphaOff val="0"/>
-            </a:schemeClr>
+            <a:schemeClr val="tx1"/>
           </a:solidFill>
           <a:prstDash val="solid"/>
+          <a:round/>
+          <a:headEnd type="none" w="lg" len="lg"/>
+          <a:tailEnd type="triangle" w="lg" len="lg"/>
         </a:ln>
         <a:effectLst/>
       </dsp:spPr>
       <dsp:style>
-        <a:lnRef idx="2">
+        <a:lnRef idx="1">
           <a:scrgbClr r="0" g="0" b="0"/>
         </a:lnRef>
         <a:fillRef idx="0">
@@ -2316,35 +2507,51 @@
         <a:prstGeom prst="ellipse">
           <a:avLst/>
         </a:prstGeom>
-        <a:solidFill>
-          <a:schemeClr val="accent6">
-            <a:hueOff val="0"/>
-            <a:satOff val="0"/>
-            <a:lumOff val="0"/>
-            <a:alphaOff val="0"/>
-          </a:schemeClr>
-        </a:solidFill>
-        <a:ln w="15875" cap="flat" cmpd="sng" algn="ctr">
+        <a:gradFill rotWithShape="0">
+          <a:gsLst>
+            <a:gs pos="0">
+              <a:schemeClr val="accent6">
+                <a:hueOff val="0"/>
+                <a:satOff val="0"/>
+                <a:lumOff val="0"/>
+                <a:alphaOff val="0"/>
+              </a:schemeClr>
+            </a:gs>
+            <a:gs pos="100000">
+              <a:schemeClr val="accent6">
+                <a:hueOff val="0"/>
+                <a:satOff val="0"/>
+                <a:lumOff val="0"/>
+                <a:alphaOff val="0"/>
+                <a:shade val="76000"/>
+                <a:lumMod val="90000"/>
+              </a:schemeClr>
+            </a:gs>
+          </a:gsLst>
+          <a:lin ang="5400000" scaled="0"/>
+        </a:gradFill>
+        <a:ln w="15875">
           <a:solidFill>
-            <a:schemeClr val="lt1">
-              <a:hueOff val="0"/>
-              <a:satOff val="0"/>
-              <a:lumOff val="0"/>
-              <a:alphaOff val="0"/>
-            </a:schemeClr>
+            <a:schemeClr val="tx1"/>
           </a:solidFill>
           <a:prstDash val="solid"/>
         </a:ln>
-        <a:effectLst/>
+        <a:effectLst>
+          <a:outerShdw blurRad="38100" dist="38100" dir="4800000" sx="98000" sy="98000" rotWithShape="0">
+            <a:srgbClr val="000000">
+              <a:alpha val="32000"/>
+            </a:srgbClr>
+          </a:outerShdw>
+        </a:effectLst>
       </dsp:spPr>
       <dsp:style>
-        <a:lnRef idx="2">
+        <a:lnRef idx="0">
           <a:scrgbClr r="0" g="0" b="0"/>
         </a:lnRef>
-        <a:fillRef idx="1">
+        <a:fillRef idx="3">
           <a:scrgbClr r="0" g="0" b="0"/>
         </a:fillRef>
-        <a:effectRef idx="0">
+        <a:effectRef idx="2">
           <a:scrgbClr r="0" g="0" b="0"/>
         </a:effectRef>
         <a:fontRef idx="minor">
@@ -2609,11 +2816,11 @@
 </file>
 
 <file path=ppt/diagrams/quickStyle1.xml><?xml version="1.0" encoding="utf-8"?>
-<dgm:styleDef xmlns:dgm="http://schemas.openxmlformats.org/drawingml/2006/diagram" xmlns:a="http://schemas.openxmlformats.org/drawingml/2006/main" uniqueId="urn:microsoft.com/office/officeart/2005/8/quickstyle/simple1">
+<dgm:styleDef xmlns:dgm="http://schemas.openxmlformats.org/drawingml/2006/diagram" xmlns:a="http://schemas.openxmlformats.org/drawingml/2006/main" uniqueId="urn:microsoft.com/office/officeart/2005/8/quickstyle/simple4">
   <dgm:title val=""/>
   <dgm:desc val=""/>
   <dgm:catLst>
-    <dgm:cat type="simple" pri="10100"/>
+    <dgm:cat type="simple" pri="10400"/>
   </dgm:catLst>
   <dgm:scene3d>
     <a:camera prst="orthographicFront"/>
@@ -2627,13 +2834,13 @@
     <dgm:sp3d/>
     <dgm:txPr/>
     <dgm:style>
-      <a:lnRef idx="2">
+      <a:lnRef idx="0">
         <a:scrgbClr r="0" g="0" b="0"/>
       </a:lnRef>
-      <a:fillRef idx="1">
+      <a:fillRef idx="3">
         <a:scrgbClr r="0" g="0" b="0"/>
       </a:fillRef>
-      <a:effectRef idx="0">
+      <a:effectRef idx="2">
         <a:scrgbClr r="0" g="0" b="0"/>
       </a:effectRef>
       <a:fontRef idx="minor">
@@ -2649,13 +2856,13 @@
     <dgm:sp3d/>
     <dgm:txPr/>
     <dgm:style>
-      <a:lnRef idx="2">
+      <a:lnRef idx="1">
         <a:scrgbClr r="0" g="0" b="0"/>
       </a:lnRef>
-      <a:fillRef idx="1">
+      <a:fillRef idx="3">
         <a:scrgbClr r="0" g="0" b="0"/>
       </a:fillRef>
-      <a:effectRef idx="0">
+      <a:effectRef idx="2">
         <a:scrgbClr r="0" g="0" b="0"/>
       </a:effectRef>
       <a:fontRef idx="minor">
@@ -2671,10 +2878,10 @@
     <dgm:sp3d/>
     <dgm:txPr/>
     <dgm:style>
-      <a:lnRef idx="2">
+      <a:lnRef idx="0">
         <a:scrgbClr r="0" g="0" b="0"/>
       </a:lnRef>
-      <a:fillRef idx="1">
+      <a:fillRef idx="3">
         <a:scrgbClr r="0" g="0" b="0"/>
       </a:fillRef>
       <a:effectRef idx="0">
@@ -2693,13 +2900,13 @@
     <dgm:sp3d/>
     <dgm:txPr/>
     <dgm:style>
-      <a:lnRef idx="2">
+      <a:lnRef idx="1">
         <a:scrgbClr r="0" g="0" b="0"/>
       </a:lnRef>
-      <a:fillRef idx="1">
+      <a:fillRef idx="3">
         <a:scrgbClr r="0" g="0" b="0"/>
       </a:fillRef>
-      <a:effectRef idx="0">
+      <a:effectRef idx="2">
         <a:scrgbClr r="0" g="0" b="0"/>
       </a:effectRef>
       <a:fontRef idx="minor">
@@ -2715,13 +2922,13 @@
     <dgm:sp3d/>
     <dgm:txPr/>
     <dgm:style>
-      <a:lnRef idx="2">
+      <a:lnRef idx="0">
         <a:scrgbClr r="0" g="0" b="0"/>
       </a:lnRef>
-      <a:fillRef idx="1">
+      <a:fillRef idx="3">
         <a:scrgbClr r="0" g="0" b="0"/>
       </a:fillRef>
-      <a:effectRef idx="0">
+      <a:effectRef idx="2">
         <a:scrgbClr r="0" g="0" b="0"/>
       </a:effectRef>
       <a:fontRef idx="minor">
@@ -2737,13 +2944,13 @@
     <dgm:sp3d/>
     <dgm:txPr/>
     <dgm:style>
-      <a:lnRef idx="2">
+      <a:lnRef idx="0">
         <a:scrgbClr r="0" g="0" b="0"/>
       </a:lnRef>
-      <a:fillRef idx="1">
+      <a:fillRef idx="3">
         <a:scrgbClr r="0" g="0" b="0"/>
       </a:fillRef>
-      <a:effectRef idx="0">
+      <a:effectRef idx="2">
         <a:scrgbClr r="0" g="0" b="0"/>
       </a:effectRef>
       <a:fontRef idx="minor">
@@ -2759,13 +2966,13 @@
     <dgm:sp3d/>
     <dgm:txPr/>
     <dgm:style>
-      <a:lnRef idx="2">
+      <a:lnRef idx="0">
         <a:scrgbClr r="0" g="0" b="0"/>
       </a:lnRef>
-      <a:fillRef idx="1">
+      <a:fillRef idx="3">
         <a:scrgbClr r="0" g="0" b="0"/>
       </a:fillRef>
-      <a:effectRef idx="0">
+      <a:effectRef idx="2">
         <a:scrgbClr r="0" g="0" b="0"/>
       </a:effectRef>
       <a:fontRef idx="minor">
@@ -2781,13 +2988,13 @@
     <dgm:sp3d/>
     <dgm:txPr/>
     <dgm:style>
-      <a:lnRef idx="2">
+      <a:lnRef idx="0">
         <a:scrgbClr r="0" g="0" b="0"/>
       </a:lnRef>
-      <a:fillRef idx="1">
+      <a:fillRef idx="3">
         <a:scrgbClr r="0" g="0" b="0"/>
       </a:fillRef>
-      <a:effectRef idx="0">
+      <a:effectRef idx="2">
         <a:scrgbClr r="0" g="0" b="0"/>
       </a:effectRef>
       <a:fontRef idx="minor">
@@ -2803,13 +3010,13 @@
     <dgm:sp3d/>
     <dgm:txPr/>
     <dgm:style>
-      <a:lnRef idx="2">
+      <a:lnRef idx="0">
         <a:scrgbClr r="0" g="0" b="0"/>
       </a:lnRef>
       <a:fillRef idx="1">
         <a:scrgbClr r="0" g="0" b="0"/>
       </a:fillRef>
-      <a:effectRef idx="0">
+      <a:effectRef idx="2">
         <a:scrgbClr r="0" g="0" b="0"/>
       </a:effectRef>
       <a:fontRef idx="minor"/>
@@ -2823,13 +3030,13 @@
     <dgm:sp3d/>
     <dgm:txPr/>
     <dgm:style>
-      <a:lnRef idx="2">
+      <a:lnRef idx="0">
         <a:scrgbClr r="0" g="0" b="0"/>
       </a:lnRef>
       <a:fillRef idx="1">
         <a:scrgbClr r="0" g="0" b="0"/>
       </a:fillRef>
-      <a:effectRef idx="0">
+      <a:effectRef idx="2">
         <a:scrgbClr r="0" g="0" b="0"/>
       </a:effectRef>
       <a:fontRef idx="minor"/>
@@ -2843,13 +3050,13 @@
     <dgm:sp3d/>
     <dgm:txPr/>
     <dgm:style>
-      <a:lnRef idx="2">
+      <a:lnRef idx="0">
         <a:scrgbClr r="0" g="0" b="0"/>
       </a:lnRef>
       <a:fillRef idx="1">
         <a:scrgbClr r="0" g="0" b="0"/>
       </a:fillRef>
-      <a:effectRef idx="0">
+      <a:effectRef idx="2">
         <a:scrgbClr r="0" g="0" b="0"/>
       </a:effectRef>
       <a:fontRef idx="minor"/>
@@ -2866,10 +3073,10 @@
       <a:lnRef idx="0">
         <a:scrgbClr r="0" g="0" b="0"/>
       </a:lnRef>
-      <a:fillRef idx="1">
+      <a:fillRef idx="3">
         <a:scrgbClr r="0" g="0" b="0"/>
       </a:fillRef>
-      <a:effectRef idx="0">
+      <a:effectRef idx="2">
         <a:scrgbClr r="0" g="0" b="0"/>
       </a:effectRef>
       <a:fontRef idx="minor">
@@ -2888,10 +3095,10 @@
       <a:lnRef idx="0">
         <a:scrgbClr r="0" g="0" b="0"/>
       </a:lnRef>
-      <a:fillRef idx="1">
+      <a:fillRef idx="3">
         <a:scrgbClr r="0" g="0" b="0"/>
       </a:fillRef>
-      <a:effectRef idx="0">
+      <a:effectRef idx="2">
         <a:scrgbClr r="0" g="0" b="0"/>
       </a:effectRef>
       <a:fontRef idx="minor">
@@ -2910,10 +3117,10 @@
       <a:lnRef idx="0">
         <a:scrgbClr r="0" g="0" b="0"/>
       </a:lnRef>
-      <a:fillRef idx="1">
+      <a:fillRef idx="3">
         <a:scrgbClr r="0" g="0" b="0"/>
       </a:fillRef>
-      <a:effectRef idx="0">
+      <a:effectRef idx="2">
         <a:scrgbClr r="0" g="0" b="0"/>
       </a:effectRef>
       <a:fontRef idx="minor">
@@ -2955,7 +3162,7 @@
       <a:fillRef idx="1">
         <a:scrgbClr r="0" g="0" b="0"/>
       </a:fillRef>
-      <a:effectRef idx="0">
+      <a:effectRef idx="1">
         <a:scrgbClr r="0" g="0" b="0"/>
       </a:effectRef>
       <a:fontRef idx="minor"/>
@@ -2969,13 +3176,13 @@
     <dgm:sp3d/>
     <dgm:txPr/>
     <dgm:style>
-      <a:lnRef idx="2">
+      <a:lnRef idx="0">
         <a:scrgbClr r="0" g="0" b="0"/>
       </a:lnRef>
-      <a:fillRef idx="1">
+      <a:fillRef idx="3">
         <a:scrgbClr r="0" g="0" b="0"/>
       </a:fillRef>
-      <a:effectRef idx="0">
+      <a:effectRef idx="2">
         <a:scrgbClr r="0" g="0" b="0"/>
       </a:effectRef>
       <a:fontRef idx="minor">
@@ -2991,13 +3198,13 @@
     <dgm:sp3d/>
     <dgm:txPr/>
     <dgm:style>
-      <a:lnRef idx="2">
+      <a:lnRef idx="0">
         <a:scrgbClr r="0" g="0" b="0"/>
       </a:lnRef>
-      <a:fillRef idx="1">
+      <a:fillRef idx="3">
         <a:scrgbClr r="0" g="0" b="0"/>
       </a:fillRef>
-      <a:effectRef idx="0">
+      <a:effectRef idx="2">
         <a:scrgbClr r="0" g="0" b="0"/>
       </a:effectRef>
       <a:fontRef idx="minor">
@@ -3013,13 +3220,13 @@
     <dgm:sp3d/>
     <dgm:txPr/>
     <dgm:style>
-      <a:lnRef idx="2">
+      <a:lnRef idx="0">
         <a:scrgbClr r="0" g="0" b="0"/>
       </a:lnRef>
-      <a:fillRef idx="1">
+      <a:fillRef idx="3">
         <a:scrgbClr r="0" g="0" b="0"/>
       </a:fillRef>
-      <a:effectRef idx="0">
+      <a:effectRef idx="2">
         <a:scrgbClr r="0" g="0" b="0"/>
       </a:effectRef>
       <a:fontRef idx="minor">
@@ -3035,13 +3242,13 @@
     <dgm:sp3d/>
     <dgm:txPr/>
     <dgm:style>
-      <a:lnRef idx="2">
+      <a:lnRef idx="0">
         <a:scrgbClr r="0" g="0" b="0"/>
       </a:lnRef>
-      <a:fillRef idx="1">
+      <a:fillRef idx="3">
         <a:scrgbClr r="0" g="0" b="0"/>
       </a:fillRef>
-      <a:effectRef idx="0">
+      <a:effectRef idx="2">
         <a:scrgbClr r="0" g="0" b="0"/>
       </a:effectRef>
       <a:fontRef idx="minor">
@@ -3057,13 +3264,13 @@
     <dgm:sp3d/>
     <dgm:txPr/>
     <dgm:style>
-      <a:lnRef idx="2">
+      <a:lnRef idx="0">
         <a:scrgbClr r="0" g="0" b="0"/>
       </a:lnRef>
-      <a:fillRef idx="1">
+      <a:fillRef idx="3">
         <a:scrgbClr r="0" g="0" b="0"/>
       </a:fillRef>
-      <a:effectRef idx="0">
+      <a:effectRef idx="2">
         <a:scrgbClr r="0" g="0" b="0"/>
       </a:effectRef>
       <a:fontRef idx="minor">
@@ -3079,13 +3286,13 @@
     <dgm:sp3d/>
     <dgm:txPr/>
     <dgm:style>
-      <a:lnRef idx="2">
+      <a:lnRef idx="0">
         <a:scrgbClr r="0" g="0" b="0"/>
       </a:lnRef>
-      <a:fillRef idx="1">
+      <a:fillRef idx="3">
         <a:scrgbClr r="0" g="0" b="0"/>
       </a:fillRef>
-      <a:effectRef idx="0">
+      <a:effectRef idx="2">
         <a:scrgbClr r="0" g="0" b="0"/>
       </a:effectRef>
       <a:fontRef idx="minor">
@@ -3101,13 +3308,13 @@
     <dgm:sp3d/>
     <dgm:txPr/>
     <dgm:style>
-      <a:lnRef idx="2">
+      <a:lnRef idx="0">
         <a:scrgbClr r="0" g="0" b="0"/>
       </a:lnRef>
-      <a:fillRef idx="1">
+      <a:fillRef idx="3">
         <a:scrgbClr r="0" g="0" b="0"/>
       </a:fillRef>
-      <a:effectRef idx="0">
+      <a:effectRef idx="2">
         <a:scrgbClr r="0" g="0" b="0"/>
       </a:effectRef>
       <a:fontRef idx="minor">
@@ -3123,13 +3330,13 @@
     <dgm:sp3d/>
     <dgm:txPr/>
     <dgm:style>
-      <a:lnRef idx="2">
+      <a:lnRef idx="1">
         <a:scrgbClr r="0" g="0" b="0"/>
       </a:lnRef>
-      <a:fillRef idx="1">
+      <a:fillRef idx="3">
         <a:scrgbClr r="0" g="0" b="0"/>
       </a:fillRef>
-      <a:effectRef idx="0">
+      <a:effectRef idx="2">
         <a:scrgbClr r="0" g="0" b="0"/>
       </a:effectRef>
       <a:fontRef idx="minor">
@@ -3145,13 +3352,13 @@
     <dgm:sp3d/>
     <dgm:txPr/>
     <dgm:style>
-      <a:lnRef idx="2">
+      <a:lnRef idx="1">
         <a:scrgbClr r="0" g="0" b="0"/>
       </a:lnRef>
-      <a:fillRef idx="1">
+      <a:fillRef idx="3">
         <a:scrgbClr r="0" g="0" b="0"/>
       </a:fillRef>
-      <a:effectRef idx="0">
+      <a:effectRef idx="2">
         <a:scrgbClr r="0" g="0" b="0"/>
       </a:effectRef>
       <a:fontRef idx="minor">
@@ -3167,7 +3374,7 @@
     <dgm:sp3d/>
     <dgm:txPr/>
     <dgm:style>
-      <a:lnRef idx="2">
+      <a:lnRef idx="1">
         <a:scrgbClr r="0" g="0" b="0"/>
       </a:lnRef>
       <a:fillRef idx="0">
@@ -3187,7 +3394,7 @@
     <dgm:sp3d/>
     <dgm:txPr/>
     <dgm:style>
-      <a:lnRef idx="2">
+      <a:lnRef idx="1">
         <a:scrgbClr r="0" g="0" b="0"/>
       </a:lnRef>
       <a:fillRef idx="0">
@@ -3207,7 +3414,7 @@
     <dgm:sp3d/>
     <dgm:txPr/>
     <dgm:style>
-      <a:lnRef idx="2">
+      <a:lnRef idx="1">
         <a:scrgbClr r="0" g="0" b="0"/>
       </a:lnRef>
       <a:fillRef idx="0">
@@ -3227,7 +3434,7 @@
     <dgm:sp3d/>
     <dgm:txPr/>
     <dgm:style>
-      <a:lnRef idx="2">
+      <a:lnRef idx="1">
         <a:scrgbClr r="0" g="0" b="0"/>
       </a:lnRef>
       <a:fillRef idx="0">
@@ -3247,7 +3454,7 @@
     <dgm:sp3d/>
     <dgm:txPr/>
     <dgm:style>
-      <a:lnRef idx="2">
+      <a:lnRef idx="1">
         <a:scrgbClr r="0" g="0" b="0"/>
       </a:lnRef>
       <a:fillRef idx="1">
@@ -3267,7 +3474,7 @@
     <dgm:sp3d/>
     <dgm:txPr/>
     <dgm:style>
-      <a:lnRef idx="2">
+      <a:lnRef idx="1">
         <a:scrgbClr r="0" g="0" b="0"/>
       </a:lnRef>
       <a:fillRef idx="1">
@@ -3287,7 +3494,7 @@
     <dgm:sp3d/>
     <dgm:txPr/>
     <dgm:style>
-      <a:lnRef idx="2">
+      <a:lnRef idx="1">
         <a:scrgbClr r="0" g="0" b="0"/>
       </a:lnRef>
       <a:fillRef idx="1">
@@ -3327,7 +3534,7 @@
     <dgm:sp3d/>
     <dgm:txPr/>
     <dgm:style>
-      <a:lnRef idx="2">
+      <a:lnRef idx="1">
         <a:scrgbClr r="0" g="0" b="0"/>
       </a:lnRef>
       <a:fillRef idx="1">
@@ -3347,7 +3554,7 @@
     <dgm:sp3d/>
     <dgm:txPr/>
     <dgm:style>
-      <a:lnRef idx="2">
+      <a:lnRef idx="1">
         <a:scrgbClr r="0" g="0" b="0"/>
       </a:lnRef>
       <a:fillRef idx="1">
@@ -3367,7 +3574,7 @@
     <dgm:sp3d/>
     <dgm:txPr/>
     <dgm:style>
-      <a:lnRef idx="2">
+      <a:lnRef idx="1">
         <a:scrgbClr r="0" g="0" b="0"/>
       </a:lnRef>
       <a:fillRef idx="1">
@@ -3387,7 +3594,7 @@
     <dgm:sp3d/>
     <dgm:txPr/>
     <dgm:style>
-      <a:lnRef idx="2">
+      <a:lnRef idx="1">
         <a:scrgbClr r="0" g="0" b="0"/>
       </a:lnRef>
       <a:fillRef idx="1">
@@ -3407,7 +3614,7 @@
     <dgm:sp3d/>
     <dgm:txPr/>
     <dgm:style>
-      <a:lnRef idx="2">
+      <a:lnRef idx="1">
         <a:scrgbClr r="0" g="0" b="0"/>
       </a:lnRef>
       <a:fillRef idx="1">
@@ -3427,7 +3634,7 @@
     <dgm:sp3d/>
     <dgm:txPr/>
     <dgm:style>
-      <a:lnRef idx="2">
+      <a:lnRef idx="1">
         <a:scrgbClr r="0" g="0" b="0"/>
       </a:lnRef>
       <a:fillRef idx="1">
@@ -3447,7 +3654,7 @@
     <dgm:sp3d/>
     <dgm:txPr/>
     <dgm:style>
-      <a:lnRef idx="2">
+      <a:lnRef idx="1">
         <a:scrgbClr r="0" g="0" b="0"/>
       </a:lnRef>
       <a:fillRef idx="1">
@@ -3467,7 +3674,7 @@
     <dgm:sp3d/>
     <dgm:txPr/>
     <dgm:style>
-      <a:lnRef idx="2">
+      <a:lnRef idx="1">
         <a:scrgbClr r="0" g="0" b="0"/>
       </a:lnRef>
       <a:fillRef idx="1">
@@ -3487,7 +3694,7 @@
     <dgm:sp3d/>
     <dgm:txPr/>
     <dgm:style>
-      <a:lnRef idx="2">
+      <a:lnRef idx="1">
         <a:scrgbClr r="0" g="0" b="0"/>
       </a:lnRef>
       <a:fillRef idx="1">
@@ -3507,7 +3714,7 @@
     <dgm:sp3d/>
     <dgm:txPr/>
     <dgm:style>
-      <a:lnRef idx="2">
+      <a:lnRef idx="1">
         <a:scrgbClr r="0" g="0" b="0"/>
       </a:lnRef>
       <a:fillRef idx="1">
@@ -3527,7 +3734,7 @@
     <dgm:sp3d/>
     <dgm:txPr/>
     <dgm:style>
-      <a:lnRef idx="2">
+      <a:lnRef idx="1">
         <a:scrgbClr r="0" g="0" b="0"/>
       </a:lnRef>
       <a:fillRef idx="1">
@@ -3553,7 +3760,7 @@
       <a:fillRef idx="1">
         <a:scrgbClr r="0" g="0" b="0"/>
       </a:fillRef>
-      <a:effectRef idx="0">
+      <a:effectRef idx="2">
         <a:scrgbClr r="0" g="0" b="0"/>
       </a:effectRef>
       <a:fontRef idx="minor"/>
@@ -3573,7 +3780,7 @@
       <a:fillRef idx="1">
         <a:scrgbClr r="0" g="0" b="0"/>
       </a:fillRef>
-      <a:effectRef idx="0">
+      <a:effectRef idx="2">
         <a:scrgbClr r="0" g="0" b="0"/>
       </a:effectRef>
       <a:fontRef idx="minor"/>
@@ -3607,13 +3814,13 @@
     <dgm:sp3d/>
     <dgm:txPr/>
     <dgm:style>
-      <a:lnRef idx="2">
+      <a:lnRef idx="0">
         <a:scrgbClr r="0" g="0" b="0"/>
       </a:lnRef>
-      <a:fillRef idx="1">
+      <a:fillRef idx="3">
         <a:scrgbClr r="0" g="0" b="0"/>
       </a:fillRef>
-      <a:effectRef idx="0">
+      <a:effectRef idx="2">
         <a:scrgbClr r="0" g="0" b="0"/>
       </a:effectRef>
       <a:fontRef idx="minor"/>
@@ -7184,6 +7391,63 @@
       </p:grpSpPr>
       <p:sp>
         <p:nvSpPr>
+          <p:cNvPr id="3" name="Rectangle 2"/>
+          <p:cNvSpPr/>
+          <p:nvPr/>
+        </p:nvSpPr>
+        <p:spPr>
+          <a:xfrm>
+            <a:off x="0" y="0"/>
+            <a:ext cx="12403988" cy="6858000"/>
+          </a:xfrm>
+          <a:prstGeom prst="rect">
+            <a:avLst/>
+          </a:prstGeom>
+          <a:gradFill flip="none" rotWithShape="1">
+            <a:gsLst>
+              <a:gs pos="8000">
+                <a:schemeClr val="bg1">
+                  <a:lumMod val="0"/>
+                </a:schemeClr>
+              </a:gs>
+              <a:gs pos="100000">
+                <a:srgbClr val="565F72"/>
+              </a:gs>
+            </a:gsLst>
+            <a:lin ang="2400000" scaled="0"/>
+            <a:tileRect/>
+          </a:gradFill>
+          <a:ln>
+            <a:noFill/>
+          </a:ln>
+        </p:spPr>
+        <p:style>
+          <a:lnRef idx="2">
+            <a:schemeClr val="accent1">
+              <a:shade val="50000"/>
+            </a:schemeClr>
+          </a:lnRef>
+          <a:fillRef idx="1">
+            <a:schemeClr val="accent1"/>
+          </a:fillRef>
+          <a:effectRef idx="0">
+            <a:schemeClr val="accent1"/>
+          </a:effectRef>
+          <a:fontRef idx="minor">
+            <a:schemeClr val="lt1"/>
+          </a:fontRef>
+        </p:style>
+        <p:txBody>
+          <a:bodyPr rtlCol="0" anchor="ctr"/>
+          <a:lstStyle/>
+          <a:p>
+            <a:pPr algn="ctr"/>
+            <a:endParaRPr lang="en-US"/>
+          </a:p>
+        </p:txBody>
+      </p:sp>
+      <p:sp>
+        <p:nvSpPr>
           <p:cNvPr id="4" name="Title 3"/>
           <p:cNvSpPr>
             <a:spLocks noGrp="1"/>
@@ -7194,30 +7458,36 @@
         </p:nvSpPr>
         <p:spPr>
           <a:xfrm>
-            <a:off x="322612" y="300446"/>
+            <a:off x="322612" y="565832"/>
             <a:ext cx="10515600" cy="1325562"/>
           </a:xfrm>
         </p:spPr>
         <p:txBody>
-          <a:bodyPr/>
+          <a:bodyPr>
+            <a:noAutofit/>
+          </a:bodyPr>
           <a:lstStyle/>
           <a:p>
             <a:r>
-              <a:rPr lang="en-US" dirty="0" err="1" smtClean="0"/>
+              <a:rPr lang="en-US" sz="5400" dirty="0" err="1" smtClean="0"/>
               <a:t>Gerencimaneto</a:t>
             </a:r>
             <a:r>
-              <a:rPr lang="en-US" dirty="0" smtClean="0"/>
-              <a:t> de </a:t>
+              <a:rPr lang="en-US" sz="5400" dirty="0" smtClean="0"/>
+              <a:t> </a:t>
+            </a:r>
+            <a:r>
+              <a:rPr lang="en-US" sz="5400" dirty="0" smtClean="0"/>
+              <a:t>de </a:t>
             </a:r>
             <a:br>
-              <a:rPr lang="en-US" dirty="0" smtClean="0"/>
+              <a:rPr lang="en-US" sz="5400" dirty="0" smtClean="0"/>
             </a:br>
             <a:r>
-              <a:rPr lang="en-US" dirty="0" err="1" smtClean="0"/>
+              <a:rPr lang="en-US" sz="5400" dirty="0" err="1" smtClean="0"/>
               <a:t>Requerimentos</a:t>
             </a:r>
-            <a:endParaRPr lang="en-US" dirty="0"/>
+            <a:endParaRPr lang="en-US" sz="5400" dirty="0"/>
           </a:p>
         </p:txBody>
       </p:sp>
@@ -7230,13 +7500,13 @@
           <p:nvPr>
             <p:extLst>
               <p:ext uri="{D42A27DB-BD31-4B8C-83A1-F6EECF244321}">
-                <p14:modId xmlns:p14="http://schemas.microsoft.com/office/powerpoint/2010/main" val="1456528615"/>
+                <p14:modId xmlns:p14="http://schemas.microsoft.com/office/powerpoint/2010/main" val="1024146941"/>
               </p:ext>
             </p:extLst>
           </p:nvPr>
         </p:nvGraphicFramePr>
         <p:xfrm>
-          <a:off x="3797558" y="214604"/>
+          <a:off x="4357393" y="89060"/>
           <a:ext cx="8394441" cy="6526143"/>
         </p:xfrm>
         <a:graphic>
@@ -7253,100 +7523,8 @@
         </p:nvSpPr>
         <p:spPr>
           <a:xfrm>
-            <a:off x="7045777" y="3279873"/>
-            <a:ext cx="1829796" cy="707886"/>
-          </a:xfrm>
-          <a:prstGeom prst="rect">
-            <a:avLst/>
-          </a:prstGeom>
-          <a:noFill/>
-        </p:spPr>
-        <p:txBody>
-          <a:bodyPr wrap="none" rtlCol="0">
-            <a:spAutoFit/>
-          </a:bodyPr>
-          <a:lstStyle/>
-          <a:p>
-            <a:pPr algn="ctr"/>
-            <a:r>
-              <a:rPr lang="pt-BR" sz="2000" b="1" dirty="0" smtClean="0">
-                <a:solidFill>
-                  <a:schemeClr val="bg1"/>
-                </a:solidFill>
-              </a:rPr>
-              <a:t>Gerenciar</a:t>
-            </a:r>
-          </a:p>
-          <a:p>
-            <a:pPr algn="ctr"/>
-            <a:r>
-              <a:rPr lang="pt-BR" sz="2000" b="1" dirty="0" smtClean="0">
-                <a:solidFill>
-                  <a:schemeClr val="bg1"/>
-                </a:solidFill>
-              </a:rPr>
-              <a:t>Requerimentos</a:t>
-            </a:r>
-            <a:endParaRPr lang="en-US" sz="2000" b="1" dirty="0">
-              <a:solidFill>
-                <a:schemeClr val="bg1"/>
-              </a:solidFill>
-            </a:endParaRPr>
-          </a:p>
-        </p:txBody>
-      </p:sp>
-      <p:sp>
-        <p:nvSpPr>
-          <p:cNvPr id="22" name="TextBox 21"/>
-          <p:cNvSpPr txBox="1"/>
-          <p:nvPr/>
-        </p:nvSpPr>
-        <p:spPr>
-          <a:xfrm>
-            <a:off x="7159462" y="842982"/>
-            <a:ext cx="1602425" cy="646331"/>
-          </a:xfrm>
-          <a:prstGeom prst="rect">
-            <a:avLst/>
-          </a:prstGeom>
-          <a:noFill/>
-        </p:spPr>
-        <p:txBody>
-          <a:bodyPr wrap="none" rtlCol="0">
-            <a:spAutoFit/>
-          </a:bodyPr>
-          <a:lstStyle/>
-          <a:p>
-            <a:pPr algn="ctr"/>
-            <a:r>
-              <a:rPr lang="pt-BR" dirty="0" smtClean="0"/>
-              <a:t>Entender os</a:t>
-            </a:r>
-          </a:p>
-          <a:p>
-            <a:pPr algn="ctr"/>
-            <a:r>
-              <a:rPr lang="pt-BR" dirty="0"/>
-              <a:t>r</a:t>
-            </a:r>
-            <a:r>
-              <a:rPr lang="pt-BR" dirty="0" smtClean="0"/>
-              <a:t>equerimentos</a:t>
-            </a:r>
-            <a:endParaRPr lang="en-US" dirty="0"/>
-          </a:p>
-        </p:txBody>
-      </p:sp>
-      <p:sp>
-        <p:nvSpPr>
-          <p:cNvPr id="24" name="TextBox 23"/>
-          <p:cNvSpPr txBox="1"/>
-          <p:nvPr/>
-        </p:nvSpPr>
-        <p:spPr>
-          <a:xfrm>
-            <a:off x="9108839" y="2291378"/>
-            <a:ext cx="2634458" cy="1231106"/>
+            <a:off x="7572659" y="3211993"/>
+            <a:ext cx="1949944" cy="707886"/>
           </a:xfrm>
           <a:prstGeom prst="rect">
             <a:avLst/>
@@ -7361,53 +7539,42 @@
           <a:p>
             <a:pPr algn="ctr"/>
             <a:r>
-              <a:rPr lang="pt-BR" dirty="0" smtClean="0"/>
-              <a:t>Obter</a:t>
+              <a:rPr lang="pt-BR" sz="2000" b="1" dirty="0" smtClean="0">
+                <a:solidFill>
+                  <a:schemeClr val="bg1"/>
+                </a:solidFill>
+              </a:rPr>
+              <a:t>Gerenciar</a:t>
             </a:r>
           </a:p>
           <a:p>
             <a:pPr algn="ctr"/>
             <a:r>
-              <a:rPr lang="en-US" dirty="0" err="1"/>
-              <a:t>c</a:t>
-            </a:r>
-            <a:r>
-              <a:rPr lang="en-US" dirty="0" err="1" smtClean="0"/>
-              <a:t>omprometimento</a:t>
-            </a:r>
-            <a:endParaRPr lang="en-US" dirty="0" smtClean="0"/>
-          </a:p>
-          <a:p>
-            <a:pPr algn="ctr"/>
-            <a:r>
-              <a:rPr lang="pt-BR" dirty="0"/>
-              <a:t>c</a:t>
-            </a:r>
-            <a:r>
-              <a:rPr lang="pt-BR" dirty="0" smtClean="0"/>
-              <a:t>om os </a:t>
-            </a:r>
-          </a:p>
-          <a:p>
-            <a:pPr algn="ctr"/>
-            <a:r>
-              <a:rPr lang="pt-BR" dirty="0" smtClean="0"/>
-              <a:t>requerimentos</a:t>
-            </a:r>
-            <a:endParaRPr lang="en-US" dirty="0"/>
+              <a:rPr lang="pt-BR" sz="2000" b="1" dirty="0" smtClean="0">
+                <a:solidFill>
+                  <a:schemeClr val="bg1"/>
+                </a:solidFill>
+              </a:rPr>
+              <a:t>Requerimentos</a:t>
+            </a:r>
+            <a:endParaRPr lang="en-US" sz="2000" b="1" dirty="0">
+              <a:solidFill>
+                <a:schemeClr val="bg1"/>
+              </a:solidFill>
+            </a:endParaRPr>
           </a:p>
         </p:txBody>
       </p:sp>
       <p:sp>
         <p:nvSpPr>
-          <p:cNvPr id="25" name="TextBox 24"/>
+          <p:cNvPr id="22" name="TextBox 21"/>
           <p:cNvSpPr txBox="1"/>
           <p:nvPr/>
         </p:nvSpPr>
         <p:spPr>
           <a:xfrm>
-            <a:off x="8482691" y="5207126"/>
-            <a:ext cx="2099388" cy="969496"/>
+            <a:off x="7572659" y="740416"/>
+            <a:ext cx="1927655" cy="646331"/>
           </a:xfrm>
           <a:prstGeom prst="rect">
             <a:avLst/>
@@ -7422,6 +7589,109 @@
           <a:p>
             <a:pPr algn="ctr"/>
             <a:r>
+              <a:rPr lang="pt-BR" dirty="0" smtClean="0"/>
+              <a:t>Entender os</a:t>
+            </a:r>
+          </a:p>
+          <a:p>
+            <a:pPr algn="ctr"/>
+            <a:r>
+              <a:rPr lang="pt-BR" dirty="0"/>
+              <a:t>r</a:t>
+            </a:r>
+            <a:r>
+              <a:rPr lang="pt-BR" dirty="0" smtClean="0"/>
+              <a:t>equerimentos</a:t>
+            </a:r>
+            <a:endParaRPr lang="en-US" dirty="0"/>
+          </a:p>
+        </p:txBody>
+      </p:sp>
+      <p:sp>
+        <p:nvSpPr>
+          <p:cNvPr id="24" name="TextBox 23"/>
+          <p:cNvSpPr txBox="1"/>
+          <p:nvPr/>
+        </p:nvSpPr>
+        <p:spPr>
+          <a:xfrm>
+            <a:off x="9918018" y="2165834"/>
+            <a:ext cx="2034747" cy="1231106"/>
+          </a:xfrm>
+          <a:prstGeom prst="rect">
+            <a:avLst/>
+          </a:prstGeom>
+          <a:noFill/>
+        </p:spPr>
+        <p:txBody>
+          <a:bodyPr wrap="square" rtlCol="0">
+            <a:spAutoFit/>
+          </a:bodyPr>
+          <a:lstStyle/>
+          <a:p>
+            <a:pPr algn="ctr"/>
+            <a:r>
+              <a:rPr lang="pt-BR" dirty="0" smtClean="0"/>
+              <a:t>Obter</a:t>
+            </a:r>
+          </a:p>
+          <a:p>
+            <a:pPr algn="ctr"/>
+            <a:r>
+              <a:rPr lang="en-US" dirty="0" err="1"/>
+              <a:t>c</a:t>
+            </a:r>
+            <a:r>
+              <a:rPr lang="en-US" dirty="0" err="1" smtClean="0"/>
+              <a:t>omprometimento</a:t>
+            </a:r>
+            <a:endParaRPr lang="en-US" dirty="0" smtClean="0"/>
+          </a:p>
+          <a:p>
+            <a:pPr algn="ctr"/>
+            <a:r>
+              <a:rPr lang="pt-BR" dirty="0"/>
+              <a:t>c</a:t>
+            </a:r>
+            <a:r>
+              <a:rPr lang="pt-BR" dirty="0" smtClean="0"/>
+              <a:t>om os </a:t>
+            </a:r>
+          </a:p>
+          <a:p>
+            <a:pPr algn="ctr"/>
+            <a:r>
+              <a:rPr lang="pt-BR" dirty="0" smtClean="0"/>
+              <a:t>requerimentos</a:t>
+            </a:r>
+            <a:endParaRPr lang="en-US" dirty="0"/>
+          </a:p>
+        </p:txBody>
+      </p:sp>
+      <p:sp>
+        <p:nvSpPr>
+          <p:cNvPr id="25" name="TextBox 24"/>
+          <p:cNvSpPr txBox="1"/>
+          <p:nvPr/>
+        </p:nvSpPr>
+        <p:spPr>
+          <a:xfrm>
+            <a:off x="9042526" y="5146660"/>
+            <a:ext cx="1919417" cy="969496"/>
+          </a:xfrm>
+          <a:prstGeom prst="rect">
+            <a:avLst/>
+          </a:prstGeom>
+          <a:noFill/>
+        </p:spPr>
+        <p:txBody>
+          <a:bodyPr wrap="square" rtlCol="0">
+            <a:spAutoFit/>
+          </a:bodyPr>
+          <a:lstStyle/>
+          <a:p>
+            <a:pPr algn="ctr"/>
+            <a:r>
               <a:rPr lang="en-US" sz="1900" dirty="0" err="1" smtClean="0"/>
               <a:t>Gerenciar</a:t>
             </a:r>
@@ -7453,7 +7723,7 @@
         </p:nvSpPr>
         <p:spPr>
           <a:xfrm>
-            <a:off x="4461197" y="5091709"/>
+            <a:off x="5021032" y="4966165"/>
             <a:ext cx="4021494" cy="1200329"/>
           </a:xfrm>
           <a:prstGeom prst="rect">
@@ -7517,7 +7787,7 @@
         </p:nvSpPr>
         <p:spPr>
           <a:xfrm>
-            <a:off x="4386621" y="2291378"/>
+            <a:off x="4946456" y="2165834"/>
             <a:ext cx="2425890" cy="1200329"/>
           </a:xfrm>
           <a:prstGeom prst="rect">
@@ -7533,47 +7803,83 @@
           <a:p>
             <a:pPr algn="ctr"/>
             <a:r>
-              <a:rPr lang="en-US" b="1" dirty="0" err="1" smtClean="0"/>
+              <a:rPr lang="en-US" dirty="0" err="1" smtClean="0"/>
               <a:t>Assegurar</a:t>
             </a:r>
             <a:r>
-              <a:rPr lang="en-US" b="1" dirty="0" smtClean="0"/>
+              <a:rPr lang="en-US" dirty="0" smtClean="0"/>
               <a:t> </a:t>
             </a:r>
           </a:p>
           <a:p>
             <a:pPr algn="ctr"/>
             <a:r>
-              <a:rPr lang="en-US" b="1" dirty="0" err="1" smtClean="0"/>
+              <a:rPr lang="en-US" dirty="0" err="1" smtClean="0"/>
               <a:t>alinhamento</a:t>
             </a:r>
             <a:r>
-              <a:rPr lang="en-US" b="1" dirty="0" smtClean="0"/>
+              <a:rPr lang="en-US" dirty="0" smtClean="0"/>
               <a:t> entre </a:t>
             </a:r>
             <a:r>
-              <a:rPr lang="en-US" b="1" dirty="0" err="1" smtClean="0"/>
+              <a:rPr lang="en-US" dirty="0" err="1" smtClean="0"/>
               <a:t>requerimentos</a:t>
             </a:r>
             <a:r>
-              <a:rPr lang="en-US" b="1" dirty="0"/>
+              <a:rPr lang="en-US" dirty="0"/>
               <a:t> </a:t>
             </a:r>
             <a:r>
-              <a:rPr lang="en-US" b="1" dirty="0" smtClean="0"/>
+              <a:rPr lang="en-US" dirty="0" smtClean="0"/>
               <a:t>e o </a:t>
             </a:r>
             <a:r>
-              <a:rPr lang="en-US" b="1" dirty="0" err="1" smtClean="0"/>
+              <a:rPr lang="en-US" dirty="0" err="1" smtClean="0"/>
               <a:t>plano</a:t>
             </a:r>
             <a:r>
-              <a:rPr lang="en-US" b="1" dirty="0" smtClean="0"/>
+              <a:rPr lang="en-US" dirty="0" smtClean="0"/>
               <a:t> do </a:t>
             </a:r>
             <a:r>
-              <a:rPr lang="en-US" b="1" dirty="0" err="1" smtClean="0"/>
+              <a:rPr lang="en-US" dirty="0" err="1" smtClean="0"/>
               <a:t>projeto</a:t>
+            </a:r>
+            <a:endParaRPr lang="en-US" dirty="0"/>
+          </a:p>
+        </p:txBody>
+      </p:sp>
+      <p:sp>
+        <p:nvSpPr>
+          <p:cNvPr id="2" name="TextBox 1"/>
+          <p:cNvSpPr txBox="1"/>
+          <p:nvPr/>
+        </p:nvSpPr>
+        <p:spPr>
+          <a:xfrm>
+            <a:off x="322612" y="5968872"/>
+            <a:ext cx="3912973" cy="646331"/>
+          </a:xfrm>
+          <a:prstGeom prst="rect">
+            <a:avLst/>
+          </a:prstGeom>
+          <a:noFill/>
+        </p:spPr>
+        <p:txBody>
+          <a:bodyPr wrap="square" rtlCol="0">
+            <a:spAutoFit/>
+          </a:bodyPr>
+          <a:lstStyle/>
+          <a:p>
+            <a:r>
+              <a:rPr lang="pt-BR" dirty="0" smtClean="0"/>
+              <a:t>RM69493; RM; RM; RM;</a:t>
+            </a:r>
+          </a:p>
+          <a:p>
+            <a:r>
+              <a:rPr lang="pt-BR" dirty="0" smtClean="0"/>
+              <a:t>2014 – 2TDSB - FIAP</a:t>
             </a:r>
             <a:endParaRPr lang="en-US" dirty="0"/>
           </a:p>

</xml_diff>